<commit_message>
Analysis for elastic line Fe, Ei = 200 with conversion to angle. Small angle -- ei = 201.2
</commit_message>
<xml_diff>
--- a/Data/sources/reduction/Mantid_nxspe_2024/cycle10_02/EiAndElasticLineForRuns.pptx
+++ b/Data/sources/reduction/Mantid_nxspe_2024/cycle10_02/EiAndElasticLineForRuns.pptx
@@ -7,6 +7,7 @@
   <p:sldIdLst>
     <p:sldId id="258" r:id="rId2"/>
     <p:sldId id="256" r:id="rId3"/>
+    <p:sldId id="259" r:id="rId4"/>
   </p:sldIdLst>
   <p:sldSz cx="12192000" cy="6858000"/>
   <p:notesSz cx="6858000" cy="9144000"/>
@@ -3350,10 +3351,10 @@
       </p:grpSpPr>
       <p:pic>
         <p:nvPicPr>
-          <p:cNvPr id="4" name="Picture 3">
-            <a:extLst>
-              <a:ext uri="{FF2B5EF4-FFF2-40B4-BE49-F238E27FC236}">
-                <a16:creationId xmlns:a16="http://schemas.microsoft.com/office/drawing/2014/main" id="{22C2B680-4B29-C453-BEC9-AC2395F3E7BD}"/>
+          <p:cNvPr id="5" name="Picture 4">
+            <a:extLst>
+              <a:ext uri="{FF2B5EF4-FFF2-40B4-BE49-F238E27FC236}">
+                <a16:creationId xmlns:a16="http://schemas.microsoft.com/office/drawing/2014/main" id="{7D0F4639-9B70-2A96-3B9E-D53F3A89A460}"/>
               </a:ext>
             </a:extLst>
           </p:cNvPr>
@@ -3370,90 +3371,20 @@
         </p:blipFill>
         <p:spPr>
           <a:xfrm>
-            <a:off x="838200" y="1928950"/>
-            <a:ext cx="4576986" cy="3997234"/>
+            <a:off x="900858" y="3462916"/>
+            <a:ext cx="3790861" cy="3310685"/>
           </a:xfrm>
           <a:prstGeom prst="rect">
             <a:avLst/>
           </a:prstGeom>
         </p:spPr>
       </p:pic>
-      <p:sp>
-        <p:nvSpPr>
-          <p:cNvPr id="2" name="Title 1">
-            <a:extLst>
-              <a:ext uri="{FF2B5EF4-FFF2-40B4-BE49-F238E27FC236}">
-                <a16:creationId xmlns:a16="http://schemas.microsoft.com/office/drawing/2014/main" id="{BD4E6FFE-81F2-36AB-5FC1-BC7782BE5923}"/>
-              </a:ext>
-            </a:extLst>
-          </p:cNvPr>
-          <p:cNvSpPr>
-            <a:spLocks noGrp="1"/>
-          </p:cNvSpPr>
-          <p:nvPr>
-            <p:ph type="title"/>
-          </p:nvPr>
-        </p:nvSpPr>
-        <p:spPr>
-          <a:xfrm>
-            <a:off x="838200" y="365126"/>
-            <a:ext cx="10515600" cy="595414"/>
-          </a:xfrm>
-        </p:spPr>
-        <p:txBody>
-          <a:bodyPr>
-            <a:normAutofit fontScale="90000"/>
-          </a:bodyPr>
-          <a:lstStyle/>
-          <a:p>
-            <a:r>
-              <a:rPr lang="en-GB" dirty="0"/>
-              <a:t>Monitors:</a:t>
-            </a:r>
-          </a:p>
-        </p:txBody>
-      </p:sp>
-      <p:sp>
-        <p:nvSpPr>
-          <p:cNvPr id="6" name="TextBox 5">
-            <a:extLst>
-              <a:ext uri="{FF2B5EF4-FFF2-40B4-BE49-F238E27FC236}">
-                <a16:creationId xmlns:a16="http://schemas.microsoft.com/office/drawing/2014/main" id="{6EEABC28-D4AD-488F-BEC4-4A438BF72F78}"/>
-              </a:ext>
-            </a:extLst>
-          </p:cNvPr>
-          <p:cNvSpPr txBox="1"/>
-          <p:nvPr/>
-        </p:nvSpPr>
-        <p:spPr>
-          <a:xfrm>
-            <a:off x="1833154" y="2860766"/>
-            <a:ext cx="1376018" cy="369332"/>
-          </a:xfrm>
-          <a:prstGeom prst="rect">
-            <a:avLst/>
-          </a:prstGeom>
-          <a:noFill/>
-        </p:spPr>
-        <p:txBody>
-          <a:bodyPr wrap="none" rtlCol="0">
-            <a:spAutoFit/>
-          </a:bodyPr>
-          <a:lstStyle/>
-          <a:p>
-            <a:r>
-              <a:rPr lang="en-GB" dirty="0"/>
-              <a:t>Wrong IDF ?</a:t>
-            </a:r>
-          </a:p>
-        </p:txBody>
-      </p:sp>
       <p:pic>
         <p:nvPicPr>
-          <p:cNvPr id="8" name="Picture 7">
-            <a:extLst>
-              <a:ext uri="{FF2B5EF4-FFF2-40B4-BE49-F238E27FC236}">
-                <a16:creationId xmlns:a16="http://schemas.microsoft.com/office/drawing/2014/main" id="{D39F32AD-2F13-1C64-E9E7-4114F54A7C1C}"/>
+          <p:cNvPr id="4" name="Picture 3">
+            <a:extLst>
+              <a:ext uri="{FF2B5EF4-FFF2-40B4-BE49-F238E27FC236}">
+                <a16:creationId xmlns:a16="http://schemas.microsoft.com/office/drawing/2014/main" id="{22C2B680-4B29-C453-BEC9-AC2395F3E7BD}"/>
               </a:ext>
             </a:extLst>
           </p:cNvPr>
@@ -3470,14 +3401,211 @@
         </p:blipFill>
         <p:spPr>
           <a:xfrm>
-            <a:off x="5905311" y="1968136"/>
-            <a:ext cx="4576986" cy="3997234"/>
+            <a:off x="975359" y="569310"/>
+            <a:ext cx="3716361" cy="3245621"/>
           </a:xfrm>
           <a:prstGeom prst="rect">
             <a:avLst/>
           </a:prstGeom>
         </p:spPr>
       </p:pic>
+      <p:sp>
+        <p:nvSpPr>
+          <p:cNvPr id="2" name="Title 1">
+            <a:extLst>
+              <a:ext uri="{FF2B5EF4-FFF2-40B4-BE49-F238E27FC236}">
+                <a16:creationId xmlns:a16="http://schemas.microsoft.com/office/drawing/2014/main" id="{BD4E6FFE-81F2-36AB-5FC1-BC7782BE5923}"/>
+              </a:ext>
+            </a:extLst>
+          </p:cNvPr>
+          <p:cNvSpPr>
+            <a:spLocks noGrp="1"/>
+          </p:cNvSpPr>
+          <p:nvPr>
+            <p:ph type="title"/>
+          </p:nvPr>
+        </p:nvSpPr>
+        <p:spPr>
+          <a:xfrm>
+            <a:off x="900858" y="401646"/>
+            <a:ext cx="10515600" cy="595414"/>
+          </a:xfrm>
+          <a:solidFill>
+            <a:schemeClr val="bg1"/>
+          </a:solidFill>
+        </p:spPr>
+        <p:txBody>
+          <a:bodyPr>
+            <a:normAutofit fontScale="90000"/>
+          </a:bodyPr>
+          <a:lstStyle/>
+          <a:p>
+            <a:r>
+              <a:rPr lang="en-GB" dirty="0"/>
+              <a:t>Monitors:</a:t>
+            </a:r>
+          </a:p>
+        </p:txBody>
+      </p:sp>
+      <p:sp>
+        <p:nvSpPr>
+          <p:cNvPr id="6" name="TextBox 5">
+            <a:extLst>
+              <a:ext uri="{FF2B5EF4-FFF2-40B4-BE49-F238E27FC236}">
+                <a16:creationId xmlns:a16="http://schemas.microsoft.com/office/drawing/2014/main" id="{6EEABC28-D4AD-488F-BEC4-4A438BF72F78}"/>
+              </a:ext>
+            </a:extLst>
+          </p:cNvPr>
+          <p:cNvSpPr txBox="1"/>
+          <p:nvPr/>
+        </p:nvSpPr>
+        <p:spPr>
+          <a:xfrm>
+            <a:off x="1518777" y="1308075"/>
+            <a:ext cx="1376018" cy="369332"/>
+          </a:xfrm>
+          <a:prstGeom prst="rect">
+            <a:avLst/>
+          </a:prstGeom>
+          <a:noFill/>
+        </p:spPr>
+        <p:txBody>
+          <a:bodyPr wrap="none" rtlCol="0">
+            <a:spAutoFit/>
+          </a:bodyPr>
+          <a:lstStyle/>
+          <a:p>
+            <a:r>
+              <a:rPr lang="en-GB" dirty="0"/>
+              <a:t>Wrong IDF ?</a:t>
+            </a:r>
+          </a:p>
+        </p:txBody>
+      </p:sp>
+      <p:pic>
+        <p:nvPicPr>
+          <p:cNvPr id="8" name="Picture 7">
+            <a:extLst>
+              <a:ext uri="{FF2B5EF4-FFF2-40B4-BE49-F238E27FC236}">
+                <a16:creationId xmlns:a16="http://schemas.microsoft.com/office/drawing/2014/main" id="{D39F32AD-2F13-1C64-E9E7-4114F54A7C1C}"/>
+              </a:ext>
+            </a:extLst>
+          </p:cNvPr>
+          <p:cNvPicPr>
+            <a:picLocks noChangeAspect="1"/>
+          </p:cNvPicPr>
+          <p:nvPr/>
+        </p:nvPicPr>
+        <p:blipFill>
+          <a:blip r:embed="rId4"/>
+          <a:stretch>
+            <a:fillRect/>
+          </a:stretch>
+        </p:blipFill>
+        <p:spPr>
+          <a:xfrm>
+            <a:off x="6956862" y="699353"/>
+            <a:ext cx="3716361" cy="3245622"/>
+          </a:xfrm>
+          <a:prstGeom prst="rect">
+            <a:avLst/>
+          </a:prstGeom>
+        </p:spPr>
+      </p:pic>
+      <p:sp>
+        <p:nvSpPr>
+          <p:cNvPr id="7" name="TextBox 6">
+            <a:extLst>
+              <a:ext uri="{FF2B5EF4-FFF2-40B4-BE49-F238E27FC236}">
+                <a16:creationId xmlns:a16="http://schemas.microsoft.com/office/drawing/2014/main" id="{7BBF7DD8-A55F-56C8-0236-B44A1570B122}"/>
+              </a:ext>
+            </a:extLst>
+          </p:cNvPr>
+          <p:cNvSpPr txBox="1"/>
+          <p:nvPr/>
+        </p:nvSpPr>
+        <p:spPr>
+          <a:xfrm>
+            <a:off x="6304547" y="5118258"/>
+            <a:ext cx="4931543" cy="1200329"/>
+          </a:xfrm>
+          <a:prstGeom prst="rect">
+            <a:avLst/>
+          </a:prstGeom>
+          <a:noFill/>
+        </p:spPr>
+        <p:txBody>
+          <a:bodyPr wrap="none" rtlCol="0">
+            <a:spAutoFit/>
+          </a:bodyPr>
+          <a:lstStyle/>
+          <a:p>
+            <a:r>
+              <a:rPr lang="en-GB" dirty="0"/>
+              <a:t>Calibration with "detector_102_libisis.nxs" </a:t>
+            </a:r>
+          </a:p>
+          <a:p>
+            <a:r>
+              <a:rPr lang="en-GB" dirty="0"/>
+              <a:t>makes no difference to monitors signal position</a:t>
+            </a:r>
+          </a:p>
+          <a:p>
+            <a:r>
+              <a:rPr lang="en-GB" dirty="0"/>
+              <a:t>or elastic line position. Data arrive calibrated by </a:t>
+            </a:r>
+          </a:p>
+          <a:p>
+            <a:r>
+              <a:rPr lang="en-GB" dirty="0"/>
+              <a:t>control program.</a:t>
+            </a:r>
+          </a:p>
+        </p:txBody>
+      </p:sp>
+      <p:cxnSp>
+        <p:nvCxnSpPr>
+          <p:cNvPr id="10" name="Straight Arrow Connector 9">
+            <a:extLst>
+              <a:ext uri="{FF2B5EF4-FFF2-40B4-BE49-F238E27FC236}">
+                <a16:creationId xmlns:a16="http://schemas.microsoft.com/office/drawing/2014/main" id="{D5839CDF-F94D-61D4-1557-205CC0C98166}"/>
+              </a:ext>
+            </a:extLst>
+          </p:cNvPr>
+          <p:cNvCxnSpPr>
+            <a:stCxn id="7" idx="1"/>
+          </p:cNvCxnSpPr>
+          <p:nvPr/>
+        </p:nvCxnSpPr>
+        <p:spPr>
+          <a:xfrm flipH="1" flipV="1">
+            <a:off x="4691719" y="5441423"/>
+            <a:ext cx="1612828" cy="277000"/>
+          </a:xfrm>
+          <a:prstGeom prst="straightConnector1">
+            <a:avLst/>
+          </a:prstGeom>
+          <a:ln>
+            <a:tailEnd type="triangle"/>
+          </a:ln>
+        </p:spPr>
+        <p:style>
+          <a:lnRef idx="2">
+            <a:schemeClr val="accent1"/>
+          </a:lnRef>
+          <a:fillRef idx="0">
+            <a:schemeClr val="accent1"/>
+          </a:fillRef>
+          <a:effectRef idx="1">
+            <a:schemeClr val="accent1"/>
+          </a:effectRef>
+          <a:fontRef idx="minor">
+            <a:schemeClr val="tx1"/>
+          </a:fontRef>
+        </p:style>
+      </p:cxnSp>
     </p:spTree>
     <p:extLst>
       <p:ext uri="{BB962C8B-B14F-4D97-AF65-F5344CB8AC3E}">
@@ -3583,7 +3711,7 @@
         <p:spPr>
           <a:xfrm>
             <a:off x="809538" y="213919"/>
-            <a:ext cx="6656309" cy="369332"/>
+            <a:ext cx="4844083" cy="369332"/>
           </a:xfrm>
           <a:prstGeom prst="rect">
             <a:avLst/>
@@ -3598,7 +3726,7 @@
           <a:p>
             <a:r>
               <a:rPr lang="en-GB" dirty="0"/>
-              <a:t>Validate correct incident energy for mono-vanadium run N15532</a:t>
+              <a:t>Validate correct incident energy for run N15532</a:t>
             </a:r>
           </a:p>
         </p:txBody>
@@ -3820,8 +3948,8 @@
           </a:p>
         </p:txBody>
       </p:sp>
-      <mc:AlternateContent xmlns:mc="http://schemas.openxmlformats.org/markup-compatibility/2006">
-        <mc:Choice xmlns:a14="http://schemas.microsoft.com/office/drawing/2010/main" Requires="a14">
+      <mc:AlternateContent xmlns:mc="http://schemas.openxmlformats.org/markup-compatibility/2006" xmlns:a14="http://schemas.microsoft.com/office/drawing/2010/main">
+        <mc:Choice Requires="a14">
           <p:sp>
             <p:nvSpPr>
               <p:cNvPr id="12" name="TextBox 11">
@@ -4059,7 +4187,7 @@
             </p:txBody>
           </p:sp>
         </mc:Choice>
-        <mc:Fallback>
+        <mc:Fallback xmlns="">
           <p:sp>
             <p:nvSpPr>
               <p:cNvPr id="12" name="TextBox 11">
@@ -4138,6 +4266,665 @@
     <p:extLst>
       <p:ext uri="{BB962C8B-B14F-4D97-AF65-F5344CB8AC3E}">
         <p14:creationId xmlns:p14="http://schemas.microsoft.com/office/powerpoint/2010/main" val="2301658941"/>
+      </p:ext>
+    </p:extLst>
+  </p:cSld>
+  <p:clrMapOvr>
+    <a:masterClrMapping/>
+  </p:clrMapOvr>
+</p:sld>
+</file>
+
+<file path=ppt/slides/slide3.xml><?xml version="1.0" encoding="utf-8"?>
+<p:sld xmlns:a="http://schemas.openxmlformats.org/drawingml/2006/main" xmlns:r="http://schemas.openxmlformats.org/officeDocument/2006/relationships" xmlns:p="http://schemas.openxmlformats.org/presentationml/2006/main">
+  <p:cSld>
+    <p:spTree>
+      <p:nvGrpSpPr>
+        <p:cNvPr id="1" name=""/>
+        <p:cNvGrpSpPr/>
+        <p:nvPr/>
+      </p:nvGrpSpPr>
+      <p:grpSpPr>
+        <a:xfrm>
+          <a:off x="0" y="0"/>
+          <a:ext cx="0" cy="0"/>
+          <a:chOff x="0" y="0"/>
+          <a:chExt cx="0" cy="0"/>
+        </a:xfrm>
+      </p:grpSpPr>
+      <p:sp>
+        <p:nvSpPr>
+          <p:cNvPr id="4" name="TextBox 3">
+            <a:extLst>
+              <a:ext uri="{FF2B5EF4-FFF2-40B4-BE49-F238E27FC236}">
+                <a16:creationId xmlns:a16="http://schemas.microsoft.com/office/drawing/2014/main" id="{AF0A730D-636F-F284-5876-EAF39C654471}"/>
+              </a:ext>
+            </a:extLst>
+          </p:cNvPr>
+          <p:cNvSpPr txBox="1"/>
+          <p:nvPr/>
+        </p:nvSpPr>
+        <p:spPr>
+          <a:xfrm>
+            <a:off x="961938" y="366319"/>
+            <a:ext cx="7790081" cy="369332"/>
+          </a:xfrm>
+          <a:prstGeom prst="rect">
+            <a:avLst/>
+          </a:prstGeom>
+          <a:noFill/>
+        </p:spPr>
+        <p:txBody>
+          <a:bodyPr wrap="none" rtlCol="0">
+            <a:spAutoFit/>
+          </a:bodyPr>
+          <a:lstStyle/>
+          <a:p>
+            <a:r>
+              <a:rPr lang="en-GB" dirty="0"/>
+              <a:t>Validate correct incident energy for run N15532; convert to angle, small angle</a:t>
+            </a:r>
+          </a:p>
+        </p:txBody>
+      </p:sp>
+      <p:pic>
+        <p:nvPicPr>
+          <p:cNvPr id="6" name="Picture 5">
+            <a:extLst>
+              <a:ext uri="{FF2B5EF4-FFF2-40B4-BE49-F238E27FC236}">
+                <a16:creationId xmlns:a16="http://schemas.microsoft.com/office/drawing/2014/main" id="{91BD1D45-F9CB-BF01-9D9F-71F14886B302}"/>
+              </a:ext>
+            </a:extLst>
+          </p:cNvPr>
+          <p:cNvPicPr>
+            <a:picLocks noChangeAspect="1"/>
+          </p:cNvPicPr>
+          <p:nvPr/>
+        </p:nvPicPr>
+        <p:blipFill>
+          <a:blip r:embed="rId2"/>
+          <a:stretch>
+            <a:fillRect/>
+          </a:stretch>
+        </p:blipFill>
+        <p:spPr>
+          <a:xfrm>
+            <a:off x="770020" y="735651"/>
+            <a:ext cx="3397717" cy="3120235"/>
+          </a:xfrm>
+          <a:prstGeom prst="rect">
+            <a:avLst/>
+          </a:prstGeom>
+        </p:spPr>
+      </p:pic>
+      <p:pic>
+        <p:nvPicPr>
+          <p:cNvPr id="8" name="Picture 7">
+            <a:extLst>
+              <a:ext uri="{FF2B5EF4-FFF2-40B4-BE49-F238E27FC236}">
+                <a16:creationId xmlns:a16="http://schemas.microsoft.com/office/drawing/2014/main" id="{C7E9052B-B993-93DF-D7BC-8583BAE7238D}"/>
+              </a:ext>
+            </a:extLst>
+          </p:cNvPr>
+          <p:cNvPicPr>
+            <a:picLocks noChangeAspect="1"/>
+          </p:cNvPicPr>
+          <p:nvPr/>
+        </p:nvPicPr>
+        <p:blipFill>
+          <a:blip r:embed="rId3"/>
+          <a:stretch>
+            <a:fillRect/>
+          </a:stretch>
+        </p:blipFill>
+        <p:spPr>
+          <a:xfrm>
+            <a:off x="770020" y="3429000"/>
+            <a:ext cx="3397717" cy="3307031"/>
+          </a:xfrm>
+          <a:prstGeom prst="rect">
+            <a:avLst/>
+          </a:prstGeom>
+        </p:spPr>
+      </p:pic>
+      <p:sp>
+        <p:nvSpPr>
+          <p:cNvPr id="9" name="Arrow: Down 8">
+            <a:extLst>
+              <a:ext uri="{FF2B5EF4-FFF2-40B4-BE49-F238E27FC236}">
+                <a16:creationId xmlns:a16="http://schemas.microsoft.com/office/drawing/2014/main" id="{49DF91A2-98A3-A1D2-55BC-CD648B085316}"/>
+              </a:ext>
+            </a:extLst>
+          </p:cNvPr>
+          <p:cNvSpPr/>
+          <p:nvPr/>
+        </p:nvSpPr>
+        <p:spPr>
+          <a:xfrm>
+            <a:off x="2016492" y="2966987"/>
+            <a:ext cx="510139" cy="750771"/>
+          </a:xfrm>
+          <a:prstGeom prst="downArrow">
+            <a:avLst/>
+          </a:prstGeom>
+        </p:spPr>
+        <p:style>
+          <a:lnRef idx="2">
+            <a:schemeClr val="accent1">
+              <a:shade val="15000"/>
+            </a:schemeClr>
+          </a:lnRef>
+          <a:fillRef idx="1">
+            <a:schemeClr val="accent1"/>
+          </a:fillRef>
+          <a:effectRef idx="0">
+            <a:schemeClr val="accent1"/>
+          </a:effectRef>
+          <a:fontRef idx="minor">
+            <a:schemeClr val="lt1"/>
+          </a:fontRef>
+        </p:style>
+        <p:txBody>
+          <a:bodyPr rtlCol="0" anchor="ctr"/>
+          <a:lstStyle/>
+          <a:p>
+            <a:pPr algn="ctr"/>
+            <a:endParaRPr lang="en-GB"/>
+          </a:p>
+        </p:txBody>
+      </p:sp>
+      <p:pic>
+        <p:nvPicPr>
+          <p:cNvPr id="11" name="Picture 10">
+            <a:extLst>
+              <a:ext uri="{FF2B5EF4-FFF2-40B4-BE49-F238E27FC236}">
+                <a16:creationId xmlns:a16="http://schemas.microsoft.com/office/drawing/2014/main" id="{786770D2-4A3F-6505-9F52-84B66CA37FED}"/>
+              </a:ext>
+            </a:extLst>
+          </p:cNvPr>
+          <p:cNvPicPr>
+            <a:picLocks noChangeAspect="1"/>
+          </p:cNvPicPr>
+          <p:nvPr/>
+        </p:nvPicPr>
+        <p:blipFill>
+          <a:blip r:embed="rId4"/>
+          <a:stretch>
+            <a:fillRect/>
+          </a:stretch>
+        </p:blipFill>
+        <p:spPr>
+          <a:xfrm>
+            <a:off x="5982759" y="855134"/>
+            <a:ext cx="4736668" cy="2862624"/>
+          </a:xfrm>
+          <a:prstGeom prst="rect">
+            <a:avLst/>
+          </a:prstGeom>
+        </p:spPr>
+      </p:pic>
+      <p:cxnSp>
+        <p:nvCxnSpPr>
+          <p:cNvPr id="13" name="Straight Arrow Connector 12">
+            <a:extLst>
+              <a:ext uri="{FF2B5EF4-FFF2-40B4-BE49-F238E27FC236}">
+                <a16:creationId xmlns:a16="http://schemas.microsoft.com/office/drawing/2014/main" id="{1BA97FFC-7C07-2D76-B935-24E5ED06CA66}"/>
+              </a:ext>
+            </a:extLst>
+          </p:cNvPr>
+          <p:cNvCxnSpPr>
+            <a:cxnSpLocks/>
+            <a:stCxn id="8" idx="3"/>
+            <a:endCxn id="11" idx="1"/>
+          </p:cNvCxnSpPr>
+          <p:nvPr/>
+        </p:nvCxnSpPr>
+        <p:spPr>
+          <a:xfrm flipV="1">
+            <a:off x="4167737" y="2286446"/>
+            <a:ext cx="1815022" cy="2796070"/>
+          </a:xfrm>
+          <a:prstGeom prst="straightConnector1">
+            <a:avLst/>
+          </a:prstGeom>
+          <a:ln>
+            <a:tailEnd type="triangle"/>
+          </a:ln>
+        </p:spPr>
+        <p:style>
+          <a:lnRef idx="2">
+            <a:schemeClr val="accent1"/>
+          </a:lnRef>
+          <a:fillRef idx="0">
+            <a:schemeClr val="accent1"/>
+          </a:fillRef>
+          <a:effectRef idx="1">
+            <a:schemeClr val="accent1"/>
+          </a:effectRef>
+          <a:fontRef idx="minor">
+            <a:schemeClr val="tx1"/>
+          </a:fontRef>
+        </p:style>
+      </p:cxnSp>
+      <p:pic>
+        <p:nvPicPr>
+          <p:cNvPr id="16" name="Picture 15">
+            <a:extLst>
+              <a:ext uri="{FF2B5EF4-FFF2-40B4-BE49-F238E27FC236}">
+                <a16:creationId xmlns:a16="http://schemas.microsoft.com/office/drawing/2014/main" id="{4904879B-85C9-5B9E-8EB2-519457AFA0B1}"/>
+              </a:ext>
+            </a:extLst>
+          </p:cNvPr>
+          <p:cNvPicPr>
+            <a:picLocks noChangeAspect="1"/>
+          </p:cNvPicPr>
+          <p:nvPr/>
+        </p:nvPicPr>
+        <p:blipFill>
+          <a:blip r:embed="rId5"/>
+          <a:stretch>
+            <a:fillRect/>
+          </a:stretch>
+        </p:blipFill>
+        <p:spPr>
+          <a:xfrm>
+            <a:off x="6383867" y="3717758"/>
+            <a:ext cx="3723136" cy="2497667"/>
+          </a:xfrm>
+          <a:prstGeom prst="rect">
+            <a:avLst/>
+          </a:prstGeom>
+        </p:spPr>
+      </p:pic>
+      <p:sp>
+        <p:nvSpPr>
+          <p:cNvPr id="17" name="Arrow: Down 16">
+            <a:extLst>
+              <a:ext uri="{FF2B5EF4-FFF2-40B4-BE49-F238E27FC236}">
+                <a16:creationId xmlns:a16="http://schemas.microsoft.com/office/drawing/2014/main" id="{28AC2A50-3D28-60F9-CF86-E90AC56DD6FC}"/>
+              </a:ext>
+            </a:extLst>
+          </p:cNvPr>
+          <p:cNvSpPr/>
+          <p:nvPr/>
+        </p:nvSpPr>
+        <p:spPr>
+          <a:xfrm>
+            <a:off x="8010910" y="3488267"/>
+            <a:ext cx="510139" cy="593559"/>
+          </a:xfrm>
+          <a:prstGeom prst="downArrow">
+            <a:avLst/>
+          </a:prstGeom>
+        </p:spPr>
+        <p:style>
+          <a:lnRef idx="2">
+            <a:schemeClr val="accent1">
+              <a:shade val="15000"/>
+            </a:schemeClr>
+          </a:lnRef>
+          <a:fillRef idx="1">
+            <a:schemeClr val="accent1"/>
+          </a:fillRef>
+          <a:effectRef idx="0">
+            <a:schemeClr val="accent1"/>
+          </a:effectRef>
+          <a:fontRef idx="minor">
+            <a:schemeClr val="lt1"/>
+          </a:fontRef>
+        </p:style>
+        <p:txBody>
+          <a:bodyPr rtlCol="0" anchor="ctr"/>
+          <a:lstStyle/>
+          <a:p>
+            <a:pPr algn="ctr"/>
+            <a:endParaRPr lang="en-GB"/>
+          </a:p>
+        </p:txBody>
+      </p:sp>
+      <p:sp>
+        <p:nvSpPr>
+          <p:cNvPr id="18" name="TextBox 17">
+            <a:extLst>
+              <a:ext uri="{FF2B5EF4-FFF2-40B4-BE49-F238E27FC236}">
+                <a16:creationId xmlns:a16="http://schemas.microsoft.com/office/drawing/2014/main" id="{1443DF25-EBDD-7FB1-0229-D9D2AE021F53}"/>
+              </a:ext>
+            </a:extLst>
+          </p:cNvPr>
+          <p:cNvSpPr txBox="1"/>
+          <p:nvPr/>
+        </p:nvSpPr>
+        <p:spPr>
+          <a:xfrm>
+            <a:off x="1915603" y="6307015"/>
+            <a:ext cx="5104539" cy="369332"/>
+          </a:xfrm>
+          <a:prstGeom prst="rect">
+            <a:avLst/>
+          </a:prstGeom>
+          <a:solidFill>
+            <a:schemeClr val="bg1"/>
+          </a:solidFill>
+        </p:spPr>
+        <p:txBody>
+          <a:bodyPr wrap="none" rtlCol="0">
+            <a:spAutoFit/>
+          </a:bodyPr>
+          <a:lstStyle/>
+          <a:p>
+            <a:r>
+              <a:rPr lang="en-GB" dirty="0"/>
+              <a:t>Correct Ei = 201.2meV, so that </a:t>
+            </a:r>
+            <a:r>
+              <a:rPr lang="en-GB" dirty="0" err="1">
+                <a:latin typeface="Symbol" panose="05050102010706020507" pitchFamily="18" charset="2"/>
+              </a:rPr>
+              <a:t>D</a:t>
+            </a:r>
+            <a:r>
+              <a:rPr lang="en-GB" dirty="0" err="1"/>
+              <a:t>E</a:t>
+            </a:r>
+            <a:r>
+              <a:rPr lang="en-GB" sz="1600" dirty="0" err="1"/>
+              <a:t>i</a:t>
+            </a:r>
+            <a:r>
+              <a:rPr lang="en-GB" dirty="0"/>
+              <a:t> = -0.007 where:</a:t>
+            </a:r>
+          </a:p>
+        </p:txBody>
+      </p:sp>
+      <mc:AlternateContent xmlns:mc="http://schemas.openxmlformats.org/markup-compatibility/2006">
+        <mc:Choice xmlns:a14="http://schemas.microsoft.com/office/drawing/2010/main" Requires="a14">
+          <p:sp>
+            <p:nvSpPr>
+              <p:cNvPr id="19" name="TextBox 18">
+                <a:extLst>
+                  <a:ext uri="{FF2B5EF4-FFF2-40B4-BE49-F238E27FC236}">
+                    <a16:creationId xmlns:a16="http://schemas.microsoft.com/office/drawing/2014/main" id="{EF95A048-FF9A-7FF2-D4D1-6B145B05A7FB}"/>
+                  </a:ext>
+                </a:extLst>
+              </p:cNvPr>
+              <p:cNvSpPr txBox="1"/>
+              <p:nvPr/>
+            </p:nvSpPr>
+            <p:spPr>
+              <a:xfrm>
+                <a:off x="6992545" y="5981359"/>
+                <a:ext cx="4207933" cy="927113"/>
+              </a:xfrm>
+              <a:prstGeom prst="rect">
+                <a:avLst/>
+              </a:prstGeom>
+              <a:noFill/>
+            </p:spPr>
+            <p:txBody>
+              <a:bodyPr wrap="square">
+                <a:spAutoFit/>
+              </a:bodyPr>
+              <a:lstStyle/>
+              <a:p>
+                <a:pPr/>
+                <a14:m>
+                  <m:oMathPara xmlns:m="http://schemas.openxmlformats.org/officeDocument/2006/math">
+                    <m:oMathParaPr>
+                      <m:jc m:val="centerGroup"/>
+                    </m:oMathParaPr>
+                    <m:oMath xmlns:m="http://schemas.openxmlformats.org/officeDocument/2006/math">
+                      <m:r>
+                        <a:rPr lang="en-GB" i="1" smtClean="0">
+                          <a:latin typeface="Cambria Math" panose="02040503050406030204" pitchFamily="18" charset="0"/>
+                        </a:rPr>
+                        <m:t>𝛥</m:t>
+                      </m:r>
+                      <m:sSub>
+                        <m:sSubPr>
+                          <m:ctrlPr>
+                            <a:rPr lang="en-GB" i="1">
+                              <a:solidFill>
+                                <a:srgbClr val="836967"/>
+                              </a:solidFill>
+                              <a:latin typeface="Cambria Math" panose="02040503050406030204" pitchFamily="18" charset="0"/>
+                            </a:rPr>
+                          </m:ctrlPr>
+                        </m:sSubPr>
+                        <m:e>
+                          <m:r>
+                            <a:rPr lang="en-GB" i="1">
+                              <a:latin typeface="Cambria Math" panose="02040503050406030204" pitchFamily="18" charset="0"/>
+                            </a:rPr>
+                            <m:t>𝐸</m:t>
+                          </m:r>
+                        </m:e>
+                        <m:sub>
+                          <m:r>
+                            <a:rPr lang="en-GB" i="1">
+                              <a:latin typeface="Cambria Math" panose="02040503050406030204" pitchFamily="18" charset="0"/>
+                            </a:rPr>
+                            <m:t>𝑖</m:t>
+                          </m:r>
+                        </m:sub>
+                      </m:sSub>
+                      <m:r>
+                        <a:rPr lang="en-GB" i="0">
+                          <a:latin typeface="Cambria Math" panose="02040503050406030204" pitchFamily="18" charset="0"/>
+                        </a:rPr>
+                        <m:t>=</m:t>
+                      </m:r>
+                      <m:f>
+                        <m:fPr>
+                          <m:type m:val="lin"/>
+                          <m:ctrlPr>
+                            <a:rPr lang="en-GB" i="1">
+                              <a:latin typeface="Cambria Math" panose="02040503050406030204" pitchFamily="18" charset="0"/>
+                            </a:rPr>
+                          </m:ctrlPr>
+                        </m:fPr>
+                        <m:num>
+                          <m:nary>
+                            <m:naryPr>
+                              <m:limLoc m:val="undOvr"/>
+                              <m:grow m:val="on"/>
+                              <m:ctrlPr>
+                                <a:rPr lang="en-GB" i="1">
+                                  <a:latin typeface="Cambria Math" panose="02040503050406030204" pitchFamily="18" charset="0"/>
+                                </a:rPr>
+                              </m:ctrlPr>
+                            </m:naryPr>
+                            <m:sub>
+                              <m:r>
+                                <a:rPr lang="en-GB" i="0">
+                                  <a:latin typeface="Cambria Math" panose="02040503050406030204" pitchFamily="18" charset="0"/>
+                                </a:rPr>
+                                <m:t>−10</m:t>
+                              </m:r>
+                            </m:sub>
+                            <m:sup>
+                              <m:r>
+                                <a:rPr lang="en-GB" i="0">
+                                  <a:latin typeface="Cambria Math" panose="02040503050406030204" pitchFamily="18" charset="0"/>
+                                </a:rPr>
+                                <m:t>10</m:t>
+                              </m:r>
+                            </m:sup>
+                            <m:e>
+                              <m:r>
+                                <a:rPr lang="en-GB" i="1">
+                                  <a:latin typeface="Cambria Math" panose="02040503050406030204" pitchFamily="18" charset="0"/>
+                                </a:rPr>
+                                <m:t>𝑓</m:t>
+                              </m:r>
+                              <m:d>
+                                <m:dPr>
+                                  <m:ctrlPr>
+                                    <a:rPr lang="en-GB" i="1">
+                                      <a:latin typeface="Cambria Math" panose="02040503050406030204" pitchFamily="18" charset="0"/>
+                                    </a:rPr>
+                                  </m:ctrlPr>
+                                </m:dPr>
+                                <m:e>
+                                  <m:r>
+                                    <a:rPr lang="en-GB" i="1">
+                                      <a:latin typeface="Cambria Math" panose="02040503050406030204" pitchFamily="18" charset="0"/>
+                                    </a:rPr>
+                                    <m:t>𝑒</m:t>
+                                  </m:r>
+                                </m:e>
+                              </m:d>
+                              <m:r>
+                                <a:rPr lang="en-GB" i="0">
+                                  <a:latin typeface="Cambria Math" panose="02040503050406030204" pitchFamily="18" charset="0"/>
+                                </a:rPr>
+                                <m:t>⋅</m:t>
+                              </m:r>
+                              <m:r>
+                                <a:rPr lang="en-GB" i="1">
+                                  <a:latin typeface="Cambria Math" panose="02040503050406030204" pitchFamily="18" charset="0"/>
+                                </a:rPr>
+                                <m:t>𝑒</m:t>
+                              </m:r>
+                              <m:r>
+                                <a:rPr lang="en-GB" i="0">
+                                  <a:latin typeface="Cambria Math" panose="02040503050406030204" pitchFamily="18" charset="0"/>
+                                </a:rPr>
+                                <m:t>⋅</m:t>
+                              </m:r>
+                              <m:r>
+                                <a:rPr lang="en-GB" i="1">
+                                  <a:latin typeface="Cambria Math" panose="02040503050406030204" pitchFamily="18" charset="0"/>
+                                </a:rPr>
+                                <m:t>𝑑𝑒</m:t>
+                              </m:r>
+                            </m:e>
+                          </m:nary>
+                        </m:num>
+                        <m:den>
+                          <m:nary>
+                            <m:naryPr>
+                              <m:limLoc m:val="undOvr"/>
+                              <m:grow m:val="on"/>
+                              <m:ctrlPr>
+                                <a:rPr lang="en-GB" i="1">
+                                  <a:latin typeface="Cambria Math" panose="02040503050406030204" pitchFamily="18" charset="0"/>
+                                </a:rPr>
+                              </m:ctrlPr>
+                            </m:naryPr>
+                            <m:sub>
+                              <m:r>
+                                <a:rPr lang="en-GB" i="0">
+                                  <a:latin typeface="Cambria Math" panose="02040503050406030204" pitchFamily="18" charset="0"/>
+                                </a:rPr>
+                                <m:t>−10</m:t>
+                              </m:r>
+                            </m:sub>
+                            <m:sup>
+                              <m:r>
+                                <a:rPr lang="en-GB" i="0">
+                                  <a:latin typeface="Cambria Math" panose="02040503050406030204" pitchFamily="18" charset="0"/>
+                                </a:rPr>
+                                <m:t>10</m:t>
+                              </m:r>
+                            </m:sup>
+                            <m:e>
+                              <m:r>
+                                <a:rPr lang="en-GB" i="1">
+                                  <a:latin typeface="Cambria Math" panose="02040503050406030204" pitchFamily="18" charset="0"/>
+                                </a:rPr>
+                                <m:t>𝑓</m:t>
+                              </m:r>
+                              <m:d>
+                                <m:dPr>
+                                  <m:ctrlPr>
+                                    <a:rPr lang="en-GB" i="1">
+                                      <a:latin typeface="Cambria Math" panose="02040503050406030204" pitchFamily="18" charset="0"/>
+                                    </a:rPr>
+                                  </m:ctrlPr>
+                                </m:dPr>
+                                <m:e>
+                                  <m:r>
+                                    <a:rPr lang="en-GB" i="1">
+                                      <a:latin typeface="Cambria Math" panose="02040503050406030204" pitchFamily="18" charset="0"/>
+                                    </a:rPr>
+                                    <m:t>𝑒</m:t>
+                                  </m:r>
+                                </m:e>
+                              </m:d>
+                              <m:r>
+                                <a:rPr lang="en-GB" i="0">
+                                  <a:latin typeface="Cambria Math" panose="02040503050406030204" pitchFamily="18" charset="0"/>
+                                </a:rPr>
+                                <m:t>⋅</m:t>
+                              </m:r>
+                              <m:r>
+                                <a:rPr lang="en-GB" i="1">
+                                  <a:latin typeface="Cambria Math" panose="02040503050406030204" pitchFamily="18" charset="0"/>
+                                </a:rPr>
+                                <m:t>𝑑𝑒</m:t>
+                              </m:r>
+                            </m:e>
+                          </m:nary>
+                        </m:den>
+                      </m:f>
+                    </m:oMath>
+                  </m:oMathPara>
+                </a14:m>
+                <a:endParaRPr lang="en-GB" dirty="0"/>
+              </a:p>
+            </p:txBody>
+          </p:sp>
+        </mc:Choice>
+        <mc:Fallback>
+          <p:sp>
+            <p:nvSpPr>
+              <p:cNvPr id="19" name="TextBox 18">
+                <a:extLst>
+                  <a:ext uri="{FF2B5EF4-FFF2-40B4-BE49-F238E27FC236}">
+                    <a16:creationId xmlns:a16="http://schemas.microsoft.com/office/drawing/2014/main" id="{EF95A048-FF9A-7FF2-D4D1-6B145B05A7FB}"/>
+                  </a:ext>
+                </a:extLst>
+              </p:cNvPr>
+              <p:cNvSpPr txBox="1">
+                <a:spLocks noRot="1" noChangeAspect="1" noMove="1" noResize="1" noEditPoints="1" noAdjustHandles="1" noChangeArrowheads="1" noChangeShapeType="1" noTextEdit="1"/>
+              </p:cNvSpPr>
+              <p:nvPr/>
+            </p:nvSpPr>
+            <p:spPr>
+              <a:xfrm>
+                <a:off x="6992545" y="5981359"/>
+                <a:ext cx="4207933" cy="927113"/>
+              </a:xfrm>
+              <a:prstGeom prst="rect">
+                <a:avLst/>
+              </a:prstGeom>
+              <a:blipFill>
+                <a:blip r:embed="rId6"/>
+                <a:stretch>
+                  <a:fillRect/>
+                </a:stretch>
+              </a:blipFill>
+            </p:spPr>
+            <p:txBody>
+              <a:bodyPr/>
+              <a:lstStyle/>
+              <a:p>
+                <a:r>
+                  <a:rPr lang="en-GB">
+                    <a:noFill/>
+                  </a:rPr>
+                  <a:t> </a:t>
+                </a:r>
+              </a:p>
+            </p:txBody>
+          </p:sp>
+        </mc:Fallback>
+      </mc:AlternateContent>
+    </p:spTree>
+    <p:extLst>
+      <p:ext uri="{BB962C8B-B14F-4D97-AF65-F5344CB8AC3E}">
+        <p14:creationId xmlns:p14="http://schemas.microsoft.com/office/powerpoint/2010/main" val="2091191757"/>
       </p:ext>
     </p:extLst>
   </p:cSld>

</xml_diff>

<commit_message>
clarified incident energy and elastic line location for Ei=200meV 10_02
</commit_message>
<xml_diff>
--- a/Data/sources/reduction/Mantid_nxspe_2024/cycle10_02/EiAndElasticLineForRuns.pptx
+++ b/Data/sources/reduction/Mantid_nxspe_2024/cycle10_02/EiAndElasticLineForRuns.pptx
@@ -263,7 +263,7 @@
           <a:p>
             <a:fld id="{D1721A36-19D5-4488-87C2-536213FC39A1}" type="datetimeFigureOut">
               <a:rPr lang="en-GB" smtClean="0"/>
-              <a:t>16/09/2024</a:t>
+              <a:t>18/09/2024</a:t>
             </a:fld>
             <a:endParaRPr lang="en-GB"/>
           </a:p>
@@ -463,7 +463,7 @@
           <a:p>
             <a:fld id="{D1721A36-19D5-4488-87C2-536213FC39A1}" type="datetimeFigureOut">
               <a:rPr lang="en-GB" smtClean="0"/>
-              <a:t>16/09/2024</a:t>
+              <a:t>18/09/2024</a:t>
             </a:fld>
             <a:endParaRPr lang="en-GB"/>
           </a:p>
@@ -673,7 +673,7 @@
           <a:p>
             <a:fld id="{D1721A36-19D5-4488-87C2-536213FC39A1}" type="datetimeFigureOut">
               <a:rPr lang="en-GB" smtClean="0"/>
-              <a:t>16/09/2024</a:t>
+              <a:t>18/09/2024</a:t>
             </a:fld>
             <a:endParaRPr lang="en-GB"/>
           </a:p>
@@ -873,7 +873,7 @@
           <a:p>
             <a:fld id="{D1721A36-19D5-4488-87C2-536213FC39A1}" type="datetimeFigureOut">
               <a:rPr lang="en-GB" smtClean="0"/>
-              <a:t>16/09/2024</a:t>
+              <a:t>18/09/2024</a:t>
             </a:fld>
             <a:endParaRPr lang="en-GB"/>
           </a:p>
@@ -1149,7 +1149,7 @@
           <a:p>
             <a:fld id="{D1721A36-19D5-4488-87C2-536213FC39A1}" type="datetimeFigureOut">
               <a:rPr lang="en-GB" smtClean="0"/>
-              <a:t>16/09/2024</a:t>
+              <a:t>18/09/2024</a:t>
             </a:fld>
             <a:endParaRPr lang="en-GB"/>
           </a:p>
@@ -1417,7 +1417,7 @@
           <a:p>
             <a:fld id="{D1721A36-19D5-4488-87C2-536213FC39A1}" type="datetimeFigureOut">
               <a:rPr lang="en-GB" smtClean="0"/>
-              <a:t>16/09/2024</a:t>
+              <a:t>18/09/2024</a:t>
             </a:fld>
             <a:endParaRPr lang="en-GB"/>
           </a:p>
@@ -1832,7 +1832,7 @@
           <a:p>
             <a:fld id="{D1721A36-19D5-4488-87C2-536213FC39A1}" type="datetimeFigureOut">
               <a:rPr lang="en-GB" smtClean="0"/>
-              <a:t>16/09/2024</a:t>
+              <a:t>18/09/2024</a:t>
             </a:fld>
             <a:endParaRPr lang="en-GB"/>
           </a:p>
@@ -1974,7 +1974,7 @@
           <a:p>
             <a:fld id="{D1721A36-19D5-4488-87C2-536213FC39A1}" type="datetimeFigureOut">
               <a:rPr lang="en-GB" smtClean="0"/>
-              <a:t>16/09/2024</a:t>
+              <a:t>18/09/2024</a:t>
             </a:fld>
             <a:endParaRPr lang="en-GB"/>
           </a:p>
@@ -2087,7 +2087,7 @@
           <a:p>
             <a:fld id="{D1721A36-19D5-4488-87C2-536213FC39A1}" type="datetimeFigureOut">
               <a:rPr lang="en-GB" smtClean="0"/>
-              <a:t>16/09/2024</a:t>
+              <a:t>18/09/2024</a:t>
             </a:fld>
             <a:endParaRPr lang="en-GB"/>
           </a:p>
@@ -2400,7 +2400,7 @@
           <a:p>
             <a:fld id="{D1721A36-19D5-4488-87C2-536213FC39A1}" type="datetimeFigureOut">
               <a:rPr lang="en-GB" smtClean="0"/>
-              <a:t>16/09/2024</a:t>
+              <a:t>18/09/2024</a:t>
             </a:fld>
             <a:endParaRPr lang="en-GB"/>
           </a:p>
@@ -2689,7 +2689,7 @@
           <a:p>
             <a:fld id="{D1721A36-19D5-4488-87C2-536213FC39A1}" type="datetimeFigureOut">
               <a:rPr lang="en-GB" smtClean="0"/>
-              <a:t>16/09/2024</a:t>
+              <a:t>18/09/2024</a:t>
             </a:fld>
             <a:endParaRPr lang="en-GB"/>
           </a:p>
@@ -2932,7 +2932,7 @@
           <a:p>
             <a:fld id="{D1721A36-19D5-4488-87C2-536213FC39A1}" type="datetimeFigureOut">
               <a:rPr lang="en-GB" smtClean="0"/>
-              <a:t>16/09/2024</a:t>
+              <a:t>18/09/2024</a:t>
             </a:fld>
             <a:endParaRPr lang="en-GB"/>
           </a:p>
@@ -3638,10 +3638,10 @@
       </p:grpSpPr>
       <p:pic>
         <p:nvPicPr>
-          <p:cNvPr id="15" name="Picture 14">
-            <a:extLst>
-              <a:ext uri="{FF2B5EF4-FFF2-40B4-BE49-F238E27FC236}">
-                <a16:creationId xmlns:a16="http://schemas.microsoft.com/office/drawing/2014/main" id="{04174C86-39B5-CE4B-3129-2D89E50303E5}"/>
+          <p:cNvPr id="11" name="Picture 10">
+            <a:extLst>
+              <a:ext uri="{FF2B5EF4-FFF2-40B4-BE49-F238E27FC236}">
+                <a16:creationId xmlns:a16="http://schemas.microsoft.com/office/drawing/2014/main" id="{3D3D3E9D-9CD7-208C-2A66-0A6BE8CB2273}"/>
               </a:ext>
             </a:extLst>
           </p:cNvPr>
@@ -3652,6 +3652,66 @@
         </p:nvPicPr>
         <p:blipFill>
           <a:blip r:embed="rId2"/>
+          <a:stretch>
+            <a:fillRect/>
+          </a:stretch>
+        </p:blipFill>
+        <p:spPr>
+          <a:xfrm>
+            <a:off x="6778620" y="3563882"/>
+            <a:ext cx="2852998" cy="2123828"/>
+          </a:xfrm>
+          <a:prstGeom prst="rect">
+            <a:avLst/>
+          </a:prstGeom>
+        </p:spPr>
+      </p:pic>
+      <p:pic>
+        <p:nvPicPr>
+          <p:cNvPr id="6" name="Picture 5">
+            <a:extLst>
+              <a:ext uri="{FF2B5EF4-FFF2-40B4-BE49-F238E27FC236}">
+                <a16:creationId xmlns:a16="http://schemas.microsoft.com/office/drawing/2014/main" id="{0D692B88-34BF-82DB-AD9A-3B2A7729BAB6}"/>
+              </a:ext>
+            </a:extLst>
+          </p:cNvPr>
+          <p:cNvPicPr>
+            <a:picLocks noChangeAspect="1"/>
+          </p:cNvPicPr>
+          <p:nvPr/>
+        </p:nvPicPr>
+        <p:blipFill>
+          <a:blip r:embed="rId3"/>
+          <a:stretch>
+            <a:fillRect/>
+          </a:stretch>
+        </p:blipFill>
+        <p:spPr>
+          <a:xfrm>
+            <a:off x="6533960" y="1372474"/>
+            <a:ext cx="3179185" cy="2213726"/>
+          </a:xfrm>
+          <a:prstGeom prst="rect">
+            <a:avLst/>
+          </a:prstGeom>
+        </p:spPr>
+      </p:pic>
+      <p:pic>
+        <p:nvPicPr>
+          <p:cNvPr id="15" name="Picture 14">
+            <a:extLst>
+              <a:ext uri="{FF2B5EF4-FFF2-40B4-BE49-F238E27FC236}">
+                <a16:creationId xmlns:a16="http://schemas.microsoft.com/office/drawing/2014/main" id="{04174C86-39B5-CE4B-3129-2D89E50303E5}"/>
+              </a:ext>
+            </a:extLst>
+          </p:cNvPr>
+          <p:cNvPicPr>
+            <a:picLocks noChangeAspect="1"/>
+          </p:cNvPicPr>
+          <p:nvPr/>
+        </p:nvPicPr>
+        <p:blipFill>
+          <a:blip r:embed="rId4"/>
           <a:stretch>
             <a:fillRect/>
           </a:stretch>
@@ -3666,36 +3726,6 @@
           </a:prstGeom>
         </p:spPr>
       </p:pic>
-      <p:pic>
-        <p:nvPicPr>
-          <p:cNvPr id="5" name="Picture 4">
-            <a:extLst>
-              <a:ext uri="{FF2B5EF4-FFF2-40B4-BE49-F238E27FC236}">
-                <a16:creationId xmlns:a16="http://schemas.microsoft.com/office/drawing/2014/main" id="{439F7F1E-1AF3-C1C1-4F3A-6314B0FE7923}"/>
-              </a:ext>
-            </a:extLst>
-          </p:cNvPr>
-          <p:cNvPicPr>
-            <a:picLocks noChangeAspect="1"/>
-          </p:cNvPicPr>
-          <p:nvPr/>
-        </p:nvPicPr>
-        <p:blipFill>
-          <a:blip r:embed="rId3"/>
-          <a:stretch>
-            <a:fillRect/>
-          </a:stretch>
-        </p:blipFill>
-        <p:spPr>
-          <a:xfrm>
-            <a:off x="6541766" y="839421"/>
-            <a:ext cx="2711292" cy="2367862"/>
-          </a:xfrm>
-          <a:prstGeom prst="rect">
-            <a:avLst/>
-          </a:prstGeom>
-        </p:spPr>
-      </p:pic>
       <p:sp>
         <p:nvSpPr>
           <p:cNvPr id="2" name="TextBox 1">
@@ -3748,7 +3778,7 @@
         <p:spPr>
           <a:xfrm>
             <a:off x="8267830" y="2187655"/>
-            <a:ext cx="507054" cy="605879"/>
+            <a:ext cx="816069" cy="1019627"/>
           </a:xfrm>
           <a:prstGeom prst="straightConnector1">
             <a:avLst/>
@@ -3802,7 +3832,7 @@
           <a:p>
             <a:r>
               <a:rPr lang="en-GB" dirty="0"/>
-              <a:t>Binning range 166 </a:t>
+              <a:t>Binning range 162 </a:t>
             </a:r>
             <a:r>
               <a:rPr lang="en-GB" dirty="0" err="1"/>
@@ -3870,7 +3900,7 @@
         <p:spPr>
           <a:xfrm>
             <a:off x="1429421" y="6171971"/>
-            <a:ext cx="5104539" cy="369332"/>
+            <a:ext cx="4779129" cy="369332"/>
           </a:xfrm>
           <a:prstGeom prst="rect">
             <a:avLst/>
@@ -3885,7 +3915,7 @@
           <a:p>
             <a:r>
               <a:rPr lang="en-GB" dirty="0"/>
-              <a:t>Correct Ei = 201.2meV, so that </a:t>
+              <a:t>Correct Ei = 200.meV, so that </a:t>
             </a:r>
             <a:r>
               <a:rPr lang="en-GB" dirty="0" err="1">
@@ -3903,7 +3933,7 @@
             </a:r>
             <a:r>
               <a:rPr lang="en-GB" dirty="0"/>
-              <a:t> = -0.007 where:</a:t>
+              <a:t> = 0.08 where:</a:t>
             </a:r>
           </a:p>
         </p:txBody>
@@ -3922,8 +3952,8 @@
         </p:nvSpPr>
         <p:spPr>
           <a:xfrm>
-            <a:off x="1019262" y="792760"/>
-            <a:ext cx="3442417" cy="369332"/>
+            <a:off x="876649" y="839421"/>
+            <a:ext cx="5858270" cy="646331"/>
           </a:xfrm>
           <a:prstGeom prst="rect">
             <a:avLst/>
@@ -3938,13 +3968,22 @@
           <a:p>
             <a:r>
               <a:rPr lang="en-GB" dirty="0"/>
-              <a:t>Chopper peak around 201.2 </a:t>
+              <a:t>Chopper peak around 200. </a:t>
             </a:r>
             <a:r>
               <a:rPr lang="en-GB" dirty="0" err="1"/>
               <a:t>meV</a:t>
             </a:r>
-            <a:endParaRPr lang="en-GB" dirty="0"/>
+            <a:r>
+              <a:rPr lang="en-GB" dirty="0"/>
+              <a:t>. Calibration necessary,</a:t>
+            </a:r>
+          </a:p>
+          <a:p>
+            <a:r>
+              <a:rPr lang="en-GB" dirty="0"/>
+              <a:t>5.3 sec detector delay time gives 1mEv shift in elastic line</a:t>
+            </a:r>
           </a:p>
         </p:txBody>
       </p:sp>
@@ -4211,7 +4250,7 @@
                 <a:avLst/>
               </a:prstGeom>
               <a:blipFill>
-                <a:blip r:embed="rId4"/>
+                <a:blip r:embed="rId5"/>
                 <a:stretch>
                   <a:fillRect/>
                 </a:stretch>
@@ -4232,36 +4271,6 @@
           </p:sp>
         </mc:Fallback>
       </mc:AlternateContent>
-      <p:pic>
-        <p:nvPicPr>
-          <p:cNvPr id="20" name="Picture 19">
-            <a:extLst>
-              <a:ext uri="{FF2B5EF4-FFF2-40B4-BE49-F238E27FC236}">
-                <a16:creationId xmlns:a16="http://schemas.microsoft.com/office/drawing/2014/main" id="{408DBD1F-F8D2-765A-3964-C7B8775B7D59}"/>
-              </a:ext>
-            </a:extLst>
-          </p:cNvPr>
-          <p:cNvPicPr>
-            <a:picLocks noChangeAspect="1"/>
-          </p:cNvPicPr>
-          <p:nvPr/>
-        </p:nvPicPr>
-        <p:blipFill>
-          <a:blip r:embed="rId5"/>
-          <a:stretch>
-            <a:fillRect/>
-          </a:stretch>
-        </p:blipFill>
-        <p:spPr>
-          <a:xfrm>
-            <a:off x="6465677" y="3327054"/>
-            <a:ext cx="2787381" cy="2434313"/>
-          </a:xfrm>
-          <a:prstGeom prst="rect">
-            <a:avLst/>
-          </a:prstGeom>
-        </p:spPr>
-      </p:pic>
     </p:spTree>
     <p:extLst>
       <p:ext uri="{BB962C8B-B14F-4D97-AF65-F5344CB8AC3E}">
@@ -4637,8 +4646,8 @@
           </a:p>
         </p:txBody>
       </p:sp>
-      <mc:AlternateContent xmlns:mc="http://schemas.openxmlformats.org/markup-compatibility/2006">
-        <mc:Choice xmlns:a14="http://schemas.microsoft.com/office/drawing/2010/main" Requires="a14">
+      <mc:AlternateContent xmlns:mc="http://schemas.openxmlformats.org/markup-compatibility/2006" xmlns:a14="http://schemas.microsoft.com/office/drawing/2010/main">
+        <mc:Choice Requires="a14">
           <p:sp>
             <p:nvSpPr>
               <p:cNvPr id="19" name="TextBox 18">
@@ -4876,7 +4885,7 @@
             </p:txBody>
           </p:sp>
         </mc:Choice>
-        <mc:Fallback>
+        <mc:Fallback xmlns="">
           <p:sp>
             <p:nvSpPr>
               <p:cNvPr id="19" name="TextBox 18">

</xml_diff>

<commit_message>
reconciled reduction for 200meV, 10_02 EiAndElasticForRuns finished
</commit_message>
<xml_diff>
--- a/Data/sources/reduction/Mantid_nxspe_2024/cycle10_02/EiAndElasticLineForRuns.pptx
+++ b/Data/sources/reduction/Mantid_nxspe_2024/cycle10_02/EiAndElasticLineForRuns.pptx
@@ -4301,47 +4301,12 @@
           <a:chExt cx="0" cy="0"/>
         </a:xfrm>
       </p:grpSpPr>
-      <p:sp>
-        <p:nvSpPr>
-          <p:cNvPr id="4" name="TextBox 3">
-            <a:extLst>
-              <a:ext uri="{FF2B5EF4-FFF2-40B4-BE49-F238E27FC236}">
-                <a16:creationId xmlns:a16="http://schemas.microsoft.com/office/drawing/2014/main" id="{AF0A730D-636F-F284-5876-EAF39C654471}"/>
-              </a:ext>
-            </a:extLst>
-          </p:cNvPr>
-          <p:cNvSpPr txBox="1"/>
-          <p:nvPr/>
-        </p:nvSpPr>
-        <p:spPr>
-          <a:xfrm>
-            <a:off x="961938" y="366319"/>
-            <a:ext cx="7790081" cy="369332"/>
-          </a:xfrm>
-          <a:prstGeom prst="rect">
-            <a:avLst/>
-          </a:prstGeom>
-          <a:noFill/>
-        </p:spPr>
-        <p:txBody>
-          <a:bodyPr wrap="none" rtlCol="0">
-            <a:spAutoFit/>
-          </a:bodyPr>
-          <a:lstStyle/>
-          <a:p>
-            <a:r>
-              <a:rPr lang="en-GB" dirty="0"/>
-              <a:t>Validate correct incident energy for run N15532; convert to angle, small angle</a:t>
-            </a:r>
-          </a:p>
-        </p:txBody>
-      </p:sp>
       <p:pic>
         <p:nvPicPr>
-          <p:cNvPr id="6" name="Picture 5">
-            <a:extLst>
-              <a:ext uri="{FF2B5EF4-FFF2-40B4-BE49-F238E27FC236}">
-                <a16:creationId xmlns:a16="http://schemas.microsoft.com/office/drawing/2014/main" id="{91BD1D45-F9CB-BF01-9D9F-71F14886B302}"/>
+          <p:cNvPr id="20" name="Picture 19">
+            <a:extLst>
+              <a:ext uri="{FF2B5EF4-FFF2-40B4-BE49-F238E27FC236}">
+                <a16:creationId xmlns:a16="http://schemas.microsoft.com/office/drawing/2014/main" id="{63BD4217-8FED-07B3-FB16-624CC8E1C2E3}"/>
               </a:ext>
             </a:extLst>
           </p:cNvPr>
@@ -4358,8 +4323,8 @@
         </p:blipFill>
         <p:spPr>
           <a:xfrm>
-            <a:off x="770020" y="735651"/>
-            <a:ext cx="3397717" cy="3120235"/>
+            <a:off x="6673538" y="3586916"/>
+            <a:ext cx="3428108" cy="2548125"/>
           </a:xfrm>
           <a:prstGeom prst="rect">
             <a:avLst/>
@@ -4368,10 +4333,10 @@
       </p:pic>
       <p:pic>
         <p:nvPicPr>
-          <p:cNvPr id="8" name="Picture 7">
-            <a:extLst>
-              <a:ext uri="{FF2B5EF4-FFF2-40B4-BE49-F238E27FC236}">
-                <a16:creationId xmlns:a16="http://schemas.microsoft.com/office/drawing/2014/main" id="{C7E9052B-B993-93DF-D7BC-8583BAE7238D}"/>
+          <p:cNvPr id="7" name="Picture 6">
+            <a:extLst>
+              <a:ext uri="{FF2B5EF4-FFF2-40B4-BE49-F238E27FC236}">
+                <a16:creationId xmlns:a16="http://schemas.microsoft.com/office/drawing/2014/main" id="{9344B514-597A-EBCA-68DD-05B18E7C168A}"/>
               </a:ext>
             </a:extLst>
           </p:cNvPr>
@@ -4388,14 +4353,79 @@
         </p:blipFill>
         <p:spPr>
           <a:xfrm>
-            <a:off x="770020" y="3429000"/>
-            <a:ext cx="3397717" cy="3307031"/>
+            <a:off x="830059" y="3488267"/>
+            <a:ext cx="2974351" cy="2586623"/>
           </a:xfrm>
           <a:prstGeom prst="rect">
             <a:avLst/>
           </a:prstGeom>
         </p:spPr>
       </p:pic>
+      <p:pic>
+        <p:nvPicPr>
+          <p:cNvPr id="3" name="Picture 2">
+            <a:extLst>
+              <a:ext uri="{FF2B5EF4-FFF2-40B4-BE49-F238E27FC236}">
+                <a16:creationId xmlns:a16="http://schemas.microsoft.com/office/drawing/2014/main" id="{944A83EE-9543-BCE2-EBBE-C2E27095E35C}"/>
+              </a:ext>
+            </a:extLst>
+          </p:cNvPr>
+          <p:cNvPicPr>
+            <a:picLocks noChangeAspect="1"/>
+          </p:cNvPicPr>
+          <p:nvPr/>
+        </p:nvPicPr>
+        <p:blipFill>
+          <a:blip r:embed="rId4"/>
+          <a:stretch>
+            <a:fillRect/>
+          </a:stretch>
+        </p:blipFill>
+        <p:spPr>
+          <a:xfrm>
+            <a:off x="740790" y="662461"/>
+            <a:ext cx="3061541" cy="2662447"/>
+          </a:xfrm>
+          <a:prstGeom prst="rect">
+            <a:avLst/>
+          </a:prstGeom>
+        </p:spPr>
+      </p:pic>
+      <p:sp>
+        <p:nvSpPr>
+          <p:cNvPr id="4" name="TextBox 3">
+            <a:extLst>
+              <a:ext uri="{FF2B5EF4-FFF2-40B4-BE49-F238E27FC236}">
+                <a16:creationId xmlns:a16="http://schemas.microsoft.com/office/drawing/2014/main" id="{AF0A730D-636F-F284-5876-EAF39C654471}"/>
+              </a:ext>
+            </a:extLst>
+          </p:cNvPr>
+          <p:cNvSpPr txBox="1"/>
+          <p:nvPr/>
+        </p:nvSpPr>
+        <p:spPr>
+          <a:xfrm>
+            <a:off x="961938" y="366319"/>
+            <a:ext cx="7790081" cy="369332"/>
+          </a:xfrm>
+          <a:prstGeom prst="rect">
+            <a:avLst/>
+          </a:prstGeom>
+          <a:noFill/>
+        </p:spPr>
+        <p:txBody>
+          <a:bodyPr wrap="none" rtlCol="0">
+            <a:spAutoFit/>
+          </a:bodyPr>
+          <a:lstStyle/>
+          <a:p>
+            <a:r>
+              <a:rPr lang="en-GB" dirty="0"/>
+              <a:t>Validate correct incident energy for run N15532; convert to angle, small angle</a:t>
+            </a:r>
+          </a:p>
+        </p:txBody>
+      </p:sp>
       <p:sp>
         <p:nvSpPr>
           <p:cNvPr id="9" name="Arrow: Down 8">
@@ -4442,36 +4472,6 @@
           </a:p>
         </p:txBody>
       </p:sp>
-      <p:pic>
-        <p:nvPicPr>
-          <p:cNvPr id="11" name="Picture 10">
-            <a:extLst>
-              <a:ext uri="{FF2B5EF4-FFF2-40B4-BE49-F238E27FC236}">
-                <a16:creationId xmlns:a16="http://schemas.microsoft.com/office/drawing/2014/main" id="{786770D2-4A3F-6505-9F52-84B66CA37FED}"/>
-              </a:ext>
-            </a:extLst>
-          </p:cNvPr>
-          <p:cNvPicPr>
-            <a:picLocks noChangeAspect="1"/>
-          </p:cNvPicPr>
-          <p:nvPr/>
-        </p:nvPicPr>
-        <p:blipFill>
-          <a:blip r:embed="rId4"/>
-          <a:stretch>
-            <a:fillRect/>
-          </a:stretch>
-        </p:blipFill>
-        <p:spPr>
-          <a:xfrm>
-            <a:off x="5982759" y="855134"/>
-            <a:ext cx="4736668" cy="2862624"/>
-          </a:xfrm>
-          <a:prstGeom prst="rect">
-            <a:avLst/>
-          </a:prstGeom>
-        </p:spPr>
-      </p:pic>
       <p:cxnSp>
         <p:nvCxnSpPr>
           <p:cNvPr id="13" name="Straight Arrow Connector 12">
@@ -4483,15 +4483,14 @@
           </p:cNvPr>
           <p:cNvCxnSpPr>
             <a:cxnSpLocks/>
-            <a:stCxn id="8" idx="3"/>
-            <a:endCxn id="11" idx="1"/>
+            <a:stCxn id="7" idx="3"/>
           </p:cNvCxnSpPr>
           <p:nvPr/>
         </p:nvCxnSpPr>
         <p:spPr>
           <a:xfrm flipV="1">
-            <a:off x="4167737" y="2286446"/>
-            <a:ext cx="1815022" cy="2796070"/>
+            <a:off x="3804410" y="2286446"/>
+            <a:ext cx="2178349" cy="2495133"/>
           </a:xfrm>
           <a:prstGeom prst="straightConnector1">
             <a:avLst/>
@@ -4515,12 +4514,67 @@
           </a:fontRef>
         </p:style>
       </p:cxnSp>
+      <p:sp>
+        <p:nvSpPr>
+          <p:cNvPr id="18" name="TextBox 17">
+            <a:extLst>
+              <a:ext uri="{FF2B5EF4-FFF2-40B4-BE49-F238E27FC236}">
+                <a16:creationId xmlns:a16="http://schemas.microsoft.com/office/drawing/2014/main" id="{1443DF25-EBDD-7FB1-0229-D9D2AE021F53}"/>
+              </a:ext>
+            </a:extLst>
+          </p:cNvPr>
+          <p:cNvSpPr txBox="1"/>
+          <p:nvPr/>
+        </p:nvSpPr>
+        <p:spPr>
+          <a:xfrm>
+            <a:off x="1915603" y="6307015"/>
+            <a:ext cx="4734245" cy="369332"/>
+          </a:xfrm>
+          <a:prstGeom prst="rect">
+            <a:avLst/>
+          </a:prstGeom>
+          <a:solidFill>
+            <a:schemeClr val="bg1"/>
+          </a:solidFill>
+        </p:spPr>
+        <p:txBody>
+          <a:bodyPr wrap="none" rtlCol="0">
+            <a:spAutoFit/>
+          </a:bodyPr>
+          <a:lstStyle/>
+          <a:p>
+            <a:r>
+              <a:rPr lang="en-GB" dirty="0"/>
+              <a:t>Correct Ei = 200.meV, so that </a:t>
+            </a:r>
+            <a:r>
+              <a:rPr lang="en-GB" dirty="0" err="1">
+                <a:latin typeface="Symbol" panose="05050102010706020507" pitchFamily="18" charset="2"/>
+              </a:rPr>
+              <a:t>D</a:t>
+            </a:r>
+            <a:r>
+              <a:rPr lang="en-GB" dirty="0" err="1"/>
+              <a:t>E</a:t>
+            </a:r>
+            <a:r>
+              <a:rPr lang="en-GB" sz="1600" dirty="0" err="1"/>
+              <a:t>i</a:t>
+            </a:r>
+            <a:r>
+              <a:rPr lang="en-GB" dirty="0"/>
+              <a:t> = 0.1 where:</a:t>
+            </a:r>
+          </a:p>
+        </p:txBody>
+      </p:sp>
       <p:pic>
         <p:nvPicPr>
-          <p:cNvPr id="16" name="Picture 15">
-            <a:extLst>
-              <a:ext uri="{FF2B5EF4-FFF2-40B4-BE49-F238E27FC236}">
-                <a16:creationId xmlns:a16="http://schemas.microsoft.com/office/drawing/2014/main" id="{4904879B-85C9-5B9E-8EB2-519457AFA0B1}"/>
+          <p:cNvPr id="14" name="Picture 13">
+            <a:extLst>
+              <a:ext uri="{FF2B5EF4-FFF2-40B4-BE49-F238E27FC236}">
+                <a16:creationId xmlns:a16="http://schemas.microsoft.com/office/drawing/2014/main" id="{E3B110B3-6C59-1687-7EA1-2DCE307E05B3}"/>
               </a:ext>
             </a:extLst>
           </p:cNvPr>
@@ -4537,8 +4591,8 @@
         </p:blipFill>
         <p:spPr>
           <a:xfrm>
-            <a:off x="6383867" y="3717758"/>
-            <a:ext cx="3723136" cy="2497667"/>
+            <a:off x="6209243" y="662461"/>
+            <a:ext cx="4034819" cy="2999095"/>
           </a:xfrm>
           <a:prstGeom prst="rect">
             <a:avLst/>
@@ -4559,7 +4613,7 @@
         </p:nvSpPr>
         <p:spPr>
           <a:xfrm>
-            <a:off x="8010910" y="3488267"/>
+            <a:off x="8218890" y="3251639"/>
             <a:ext cx="510139" cy="593559"/>
           </a:xfrm>
           <a:prstGeom prst="downArrow">
@@ -4591,345 +4645,36 @@
           </a:p>
         </p:txBody>
       </p:sp>
-      <p:sp>
-        <p:nvSpPr>
-          <p:cNvPr id="18" name="TextBox 17">
-            <a:extLst>
-              <a:ext uri="{FF2B5EF4-FFF2-40B4-BE49-F238E27FC236}">
-                <a16:creationId xmlns:a16="http://schemas.microsoft.com/office/drawing/2014/main" id="{1443DF25-EBDD-7FB1-0229-D9D2AE021F53}"/>
-              </a:ext>
-            </a:extLst>
-          </p:cNvPr>
-          <p:cNvSpPr txBox="1"/>
+      <p:pic>
+        <p:nvPicPr>
+          <p:cNvPr id="22" name="Picture 21">
+            <a:extLst>
+              <a:ext uri="{FF2B5EF4-FFF2-40B4-BE49-F238E27FC236}">
+                <a16:creationId xmlns:a16="http://schemas.microsoft.com/office/drawing/2014/main" id="{864A158C-5DB3-8264-3D3A-615CE0B96F4D}"/>
+              </a:ext>
+            </a:extLst>
+          </p:cNvPr>
+          <p:cNvPicPr>
+            <a:picLocks noChangeAspect="1"/>
+          </p:cNvPicPr>
           <p:nvPr/>
-        </p:nvSpPr>
+        </p:nvPicPr>
+        <p:blipFill>
+          <a:blip r:embed="rId6"/>
+          <a:stretch>
+            <a:fillRect/>
+          </a:stretch>
+        </p:blipFill>
         <p:spPr>
           <a:xfrm>
-            <a:off x="1915603" y="6307015"/>
-            <a:ext cx="5104539" cy="369332"/>
+            <a:off x="6546850" y="6165819"/>
+            <a:ext cx="3187700" cy="755423"/>
           </a:xfrm>
           <a:prstGeom prst="rect">
             <a:avLst/>
           </a:prstGeom>
-          <a:solidFill>
-            <a:schemeClr val="bg1"/>
-          </a:solidFill>
         </p:spPr>
-        <p:txBody>
-          <a:bodyPr wrap="none" rtlCol="0">
-            <a:spAutoFit/>
-          </a:bodyPr>
-          <a:lstStyle/>
-          <a:p>
-            <a:r>
-              <a:rPr lang="en-GB" dirty="0"/>
-              <a:t>Correct Ei = 201.2meV, so that </a:t>
-            </a:r>
-            <a:r>
-              <a:rPr lang="en-GB" dirty="0" err="1">
-                <a:latin typeface="Symbol" panose="05050102010706020507" pitchFamily="18" charset="2"/>
-              </a:rPr>
-              <a:t>D</a:t>
-            </a:r>
-            <a:r>
-              <a:rPr lang="en-GB" dirty="0" err="1"/>
-              <a:t>E</a:t>
-            </a:r>
-            <a:r>
-              <a:rPr lang="en-GB" sz="1600" dirty="0" err="1"/>
-              <a:t>i</a:t>
-            </a:r>
-            <a:r>
-              <a:rPr lang="en-GB" dirty="0"/>
-              <a:t> = -0.007 where:</a:t>
-            </a:r>
-          </a:p>
-        </p:txBody>
-      </p:sp>
-      <mc:AlternateContent xmlns:mc="http://schemas.openxmlformats.org/markup-compatibility/2006" xmlns:a14="http://schemas.microsoft.com/office/drawing/2010/main">
-        <mc:Choice Requires="a14">
-          <p:sp>
-            <p:nvSpPr>
-              <p:cNvPr id="19" name="TextBox 18">
-                <a:extLst>
-                  <a:ext uri="{FF2B5EF4-FFF2-40B4-BE49-F238E27FC236}">
-                    <a16:creationId xmlns:a16="http://schemas.microsoft.com/office/drawing/2014/main" id="{EF95A048-FF9A-7FF2-D4D1-6B145B05A7FB}"/>
-                  </a:ext>
-                </a:extLst>
-              </p:cNvPr>
-              <p:cNvSpPr txBox="1"/>
-              <p:nvPr/>
-            </p:nvSpPr>
-            <p:spPr>
-              <a:xfrm>
-                <a:off x="6992545" y="5981359"/>
-                <a:ext cx="4207933" cy="927113"/>
-              </a:xfrm>
-              <a:prstGeom prst="rect">
-                <a:avLst/>
-              </a:prstGeom>
-              <a:noFill/>
-            </p:spPr>
-            <p:txBody>
-              <a:bodyPr wrap="square">
-                <a:spAutoFit/>
-              </a:bodyPr>
-              <a:lstStyle/>
-              <a:p>
-                <a:pPr/>
-                <a14:m>
-                  <m:oMathPara xmlns:m="http://schemas.openxmlformats.org/officeDocument/2006/math">
-                    <m:oMathParaPr>
-                      <m:jc m:val="centerGroup"/>
-                    </m:oMathParaPr>
-                    <m:oMath xmlns:m="http://schemas.openxmlformats.org/officeDocument/2006/math">
-                      <m:r>
-                        <a:rPr lang="en-GB" i="1" smtClean="0">
-                          <a:latin typeface="Cambria Math" panose="02040503050406030204" pitchFamily="18" charset="0"/>
-                        </a:rPr>
-                        <m:t>𝛥</m:t>
-                      </m:r>
-                      <m:sSub>
-                        <m:sSubPr>
-                          <m:ctrlPr>
-                            <a:rPr lang="en-GB" i="1">
-                              <a:solidFill>
-                                <a:srgbClr val="836967"/>
-                              </a:solidFill>
-                              <a:latin typeface="Cambria Math" panose="02040503050406030204" pitchFamily="18" charset="0"/>
-                            </a:rPr>
-                          </m:ctrlPr>
-                        </m:sSubPr>
-                        <m:e>
-                          <m:r>
-                            <a:rPr lang="en-GB" i="1">
-                              <a:latin typeface="Cambria Math" panose="02040503050406030204" pitchFamily="18" charset="0"/>
-                            </a:rPr>
-                            <m:t>𝐸</m:t>
-                          </m:r>
-                        </m:e>
-                        <m:sub>
-                          <m:r>
-                            <a:rPr lang="en-GB" i="1">
-                              <a:latin typeface="Cambria Math" panose="02040503050406030204" pitchFamily="18" charset="0"/>
-                            </a:rPr>
-                            <m:t>𝑖</m:t>
-                          </m:r>
-                        </m:sub>
-                      </m:sSub>
-                      <m:r>
-                        <a:rPr lang="en-GB" i="0">
-                          <a:latin typeface="Cambria Math" panose="02040503050406030204" pitchFamily="18" charset="0"/>
-                        </a:rPr>
-                        <m:t>=</m:t>
-                      </m:r>
-                      <m:f>
-                        <m:fPr>
-                          <m:type m:val="lin"/>
-                          <m:ctrlPr>
-                            <a:rPr lang="en-GB" i="1">
-                              <a:latin typeface="Cambria Math" panose="02040503050406030204" pitchFamily="18" charset="0"/>
-                            </a:rPr>
-                          </m:ctrlPr>
-                        </m:fPr>
-                        <m:num>
-                          <m:nary>
-                            <m:naryPr>
-                              <m:limLoc m:val="undOvr"/>
-                              <m:grow m:val="on"/>
-                              <m:ctrlPr>
-                                <a:rPr lang="en-GB" i="1">
-                                  <a:latin typeface="Cambria Math" panose="02040503050406030204" pitchFamily="18" charset="0"/>
-                                </a:rPr>
-                              </m:ctrlPr>
-                            </m:naryPr>
-                            <m:sub>
-                              <m:r>
-                                <a:rPr lang="en-GB" i="0">
-                                  <a:latin typeface="Cambria Math" panose="02040503050406030204" pitchFamily="18" charset="0"/>
-                                </a:rPr>
-                                <m:t>−10</m:t>
-                              </m:r>
-                            </m:sub>
-                            <m:sup>
-                              <m:r>
-                                <a:rPr lang="en-GB" i="0">
-                                  <a:latin typeface="Cambria Math" panose="02040503050406030204" pitchFamily="18" charset="0"/>
-                                </a:rPr>
-                                <m:t>10</m:t>
-                              </m:r>
-                            </m:sup>
-                            <m:e>
-                              <m:r>
-                                <a:rPr lang="en-GB" i="1">
-                                  <a:latin typeface="Cambria Math" panose="02040503050406030204" pitchFamily="18" charset="0"/>
-                                </a:rPr>
-                                <m:t>𝑓</m:t>
-                              </m:r>
-                              <m:d>
-                                <m:dPr>
-                                  <m:ctrlPr>
-                                    <a:rPr lang="en-GB" i="1">
-                                      <a:latin typeface="Cambria Math" panose="02040503050406030204" pitchFamily="18" charset="0"/>
-                                    </a:rPr>
-                                  </m:ctrlPr>
-                                </m:dPr>
-                                <m:e>
-                                  <m:r>
-                                    <a:rPr lang="en-GB" i="1">
-                                      <a:latin typeface="Cambria Math" panose="02040503050406030204" pitchFamily="18" charset="0"/>
-                                    </a:rPr>
-                                    <m:t>𝑒</m:t>
-                                  </m:r>
-                                </m:e>
-                              </m:d>
-                              <m:r>
-                                <a:rPr lang="en-GB" i="0">
-                                  <a:latin typeface="Cambria Math" panose="02040503050406030204" pitchFamily="18" charset="0"/>
-                                </a:rPr>
-                                <m:t>⋅</m:t>
-                              </m:r>
-                              <m:r>
-                                <a:rPr lang="en-GB" i="1">
-                                  <a:latin typeface="Cambria Math" panose="02040503050406030204" pitchFamily="18" charset="0"/>
-                                </a:rPr>
-                                <m:t>𝑒</m:t>
-                              </m:r>
-                              <m:r>
-                                <a:rPr lang="en-GB" i="0">
-                                  <a:latin typeface="Cambria Math" panose="02040503050406030204" pitchFamily="18" charset="0"/>
-                                </a:rPr>
-                                <m:t>⋅</m:t>
-                              </m:r>
-                              <m:r>
-                                <a:rPr lang="en-GB" i="1">
-                                  <a:latin typeface="Cambria Math" panose="02040503050406030204" pitchFamily="18" charset="0"/>
-                                </a:rPr>
-                                <m:t>𝑑𝑒</m:t>
-                              </m:r>
-                            </m:e>
-                          </m:nary>
-                        </m:num>
-                        <m:den>
-                          <m:nary>
-                            <m:naryPr>
-                              <m:limLoc m:val="undOvr"/>
-                              <m:grow m:val="on"/>
-                              <m:ctrlPr>
-                                <a:rPr lang="en-GB" i="1">
-                                  <a:latin typeface="Cambria Math" panose="02040503050406030204" pitchFamily="18" charset="0"/>
-                                </a:rPr>
-                              </m:ctrlPr>
-                            </m:naryPr>
-                            <m:sub>
-                              <m:r>
-                                <a:rPr lang="en-GB" i="0">
-                                  <a:latin typeface="Cambria Math" panose="02040503050406030204" pitchFamily="18" charset="0"/>
-                                </a:rPr>
-                                <m:t>−10</m:t>
-                              </m:r>
-                            </m:sub>
-                            <m:sup>
-                              <m:r>
-                                <a:rPr lang="en-GB" i="0">
-                                  <a:latin typeface="Cambria Math" panose="02040503050406030204" pitchFamily="18" charset="0"/>
-                                </a:rPr>
-                                <m:t>10</m:t>
-                              </m:r>
-                            </m:sup>
-                            <m:e>
-                              <m:r>
-                                <a:rPr lang="en-GB" i="1">
-                                  <a:latin typeface="Cambria Math" panose="02040503050406030204" pitchFamily="18" charset="0"/>
-                                </a:rPr>
-                                <m:t>𝑓</m:t>
-                              </m:r>
-                              <m:d>
-                                <m:dPr>
-                                  <m:ctrlPr>
-                                    <a:rPr lang="en-GB" i="1">
-                                      <a:latin typeface="Cambria Math" panose="02040503050406030204" pitchFamily="18" charset="0"/>
-                                    </a:rPr>
-                                  </m:ctrlPr>
-                                </m:dPr>
-                                <m:e>
-                                  <m:r>
-                                    <a:rPr lang="en-GB" i="1">
-                                      <a:latin typeface="Cambria Math" panose="02040503050406030204" pitchFamily="18" charset="0"/>
-                                    </a:rPr>
-                                    <m:t>𝑒</m:t>
-                                  </m:r>
-                                </m:e>
-                              </m:d>
-                              <m:r>
-                                <a:rPr lang="en-GB" i="0">
-                                  <a:latin typeface="Cambria Math" panose="02040503050406030204" pitchFamily="18" charset="0"/>
-                                </a:rPr>
-                                <m:t>⋅</m:t>
-                              </m:r>
-                              <m:r>
-                                <a:rPr lang="en-GB" i="1">
-                                  <a:latin typeface="Cambria Math" panose="02040503050406030204" pitchFamily="18" charset="0"/>
-                                </a:rPr>
-                                <m:t>𝑑𝑒</m:t>
-                              </m:r>
-                            </m:e>
-                          </m:nary>
-                        </m:den>
-                      </m:f>
-                    </m:oMath>
-                  </m:oMathPara>
-                </a14:m>
-                <a:endParaRPr lang="en-GB" dirty="0"/>
-              </a:p>
-            </p:txBody>
-          </p:sp>
-        </mc:Choice>
-        <mc:Fallback xmlns="">
-          <p:sp>
-            <p:nvSpPr>
-              <p:cNvPr id="19" name="TextBox 18">
-                <a:extLst>
-                  <a:ext uri="{FF2B5EF4-FFF2-40B4-BE49-F238E27FC236}">
-                    <a16:creationId xmlns:a16="http://schemas.microsoft.com/office/drawing/2014/main" id="{EF95A048-FF9A-7FF2-D4D1-6B145B05A7FB}"/>
-                  </a:ext>
-                </a:extLst>
-              </p:cNvPr>
-              <p:cNvSpPr txBox="1">
-                <a:spLocks noRot="1" noChangeAspect="1" noMove="1" noResize="1" noEditPoints="1" noAdjustHandles="1" noChangeArrowheads="1" noChangeShapeType="1" noTextEdit="1"/>
-              </p:cNvSpPr>
-              <p:nvPr/>
-            </p:nvSpPr>
-            <p:spPr>
-              <a:xfrm>
-                <a:off x="6992545" y="5981359"/>
-                <a:ext cx="4207933" cy="927113"/>
-              </a:xfrm>
-              <a:prstGeom prst="rect">
-                <a:avLst/>
-              </a:prstGeom>
-              <a:blipFill>
-                <a:blip r:embed="rId6"/>
-                <a:stretch>
-                  <a:fillRect/>
-                </a:stretch>
-              </a:blipFill>
-            </p:spPr>
-            <p:txBody>
-              <a:bodyPr/>
-              <a:lstStyle/>
-              <a:p>
-                <a:r>
-                  <a:rPr lang="en-GB">
-                    <a:noFill/>
-                  </a:rPr>
-                  <a:t> </a:t>
-                </a:r>
-              </a:p>
-            </p:txBody>
-          </p:sp>
-        </mc:Fallback>
-      </mc:AlternateContent>
+      </p:pic>
     </p:spTree>
     <p:extLst>
       <p:ext uri="{BB962C8B-B14F-4D97-AF65-F5344CB8AC3E}">

</xml_diff>